<commit_message>
instructions for cluster login
</commit_message>
<xml_diff>
--- a/QIIME2.pptx
+++ b/QIIME2.pptx
@@ -7,9 +7,11 @@
   <p:sldIdLst>
     <p:sldId id="270" r:id="rId2"/>
     <p:sldId id="266" r:id="rId3"/>
-    <p:sldId id="257" r:id="rId4"/>
-    <p:sldId id="268" r:id="rId5"/>
-    <p:sldId id="271" r:id="rId6"/>
+    <p:sldId id="293" r:id="rId4"/>
+    <p:sldId id="257" r:id="rId5"/>
+    <p:sldId id="268" r:id="rId6"/>
+    <p:sldId id="272" r:id="rId7"/>
+    <p:sldId id="271" r:id="rId8"/>
   </p:sldIdLst>
   <p:sldSz cx="9144000" cy="6858000" type="screen4x3"/>
   <p:notesSz cx="6858000" cy="9144000"/>
@@ -247,7 +249,7 @@
           <a:p>
             <a:fld id="{B310209D-86A0-C041-8ED8-75882419F2CF}" type="datetimeFigureOut">
               <a:rPr lang="en-CH" smtClean="0"/>
-              <a:t>01.03.23</a:t>
+              <a:t>02.03.23</a:t>
             </a:fld>
             <a:endParaRPr lang="en-CH"/>
           </a:p>
@@ -445,7 +447,7 @@
           <a:p>
             <a:fld id="{B310209D-86A0-C041-8ED8-75882419F2CF}" type="datetimeFigureOut">
               <a:rPr lang="en-CH" smtClean="0"/>
-              <a:t>01.03.23</a:t>
+              <a:t>02.03.23</a:t>
             </a:fld>
             <a:endParaRPr lang="en-CH"/>
           </a:p>
@@ -625,7 +627,7 @@
           <a:p>
             <a:fld id="{B310209D-86A0-C041-8ED8-75882419F2CF}" type="datetimeFigureOut">
               <a:rPr lang="en-CH" smtClean="0"/>
-              <a:t>01.03.23</a:t>
+              <a:t>02.03.23</a:t>
             </a:fld>
             <a:endParaRPr lang="en-CH"/>
           </a:p>
@@ -677,6 +679,225 @@
     <p:extLst>
       <p:ext uri="{BB962C8B-B14F-4D97-AF65-F5344CB8AC3E}">
         <p14:creationId xmlns:p14="http://schemas.microsoft.com/office/powerpoint/2010/main" val="1041782327"/>
+      </p:ext>
+    </p:extLst>
+  </p:cSld>
+  <p:clrMapOvr>
+    <a:masterClrMapping/>
+  </p:clrMapOvr>
+</p:sldLayout>
+</file>
+
+<file path=ppt/slideLayouts/slideLayout12.xml><?xml version="1.0" encoding="utf-8"?>
+<p:sldLayout xmlns:a="http://schemas.openxmlformats.org/drawingml/2006/main" xmlns:r="http://schemas.openxmlformats.org/officeDocument/2006/relationships" xmlns:p="http://schemas.openxmlformats.org/presentationml/2006/main" type="obj">
+  <p:cSld name="1_Two Content">
+    <p:spTree>
+      <p:nvGrpSpPr>
+        <p:cNvPr id="1" name=""/>
+        <p:cNvGrpSpPr/>
+        <p:nvPr/>
+      </p:nvGrpSpPr>
+      <p:grpSpPr>
+        <a:xfrm>
+          <a:off x="0" y="0"/>
+          <a:ext cx="0" cy="0"/>
+          <a:chOff x="0" y="0"/>
+          <a:chExt cx="0" cy="0"/>
+        </a:xfrm>
+      </p:grpSpPr>
+      <p:sp>
+        <p:nvSpPr>
+          <p:cNvPr id="2" name="Holder 2"/>
+          <p:cNvSpPr>
+            <a:spLocks noGrp="1"/>
+          </p:cNvSpPr>
+          <p:nvPr>
+            <p:ph type="title"/>
+          </p:nvPr>
+        </p:nvSpPr>
+        <p:spPr/>
+        <p:txBody>
+          <a:bodyPr lIns="0" tIns="0" rIns="0" bIns="0"/>
+          <a:lstStyle>
+            <a:lvl1pPr>
+              <a:defRPr sz="2391" b="1" i="0" u="heavy">
+                <a:solidFill>
+                  <a:schemeClr val="tx1"/>
+                </a:solidFill>
+                <a:latin typeface="Times New Roman"/>
+                <a:cs typeface="Times New Roman"/>
+              </a:defRPr>
+            </a:lvl1pPr>
+          </a:lstStyle>
+          <a:p>
+            <a:endParaRPr/>
+          </a:p>
+        </p:txBody>
+      </p:sp>
+      <p:sp>
+        <p:nvSpPr>
+          <p:cNvPr id="3" name="Holder 3"/>
+          <p:cNvSpPr>
+            <a:spLocks noGrp="1"/>
+          </p:cNvSpPr>
+          <p:nvPr>
+            <p:ph sz="half" idx="2"/>
+          </p:nvPr>
+        </p:nvSpPr>
+        <p:spPr>
+          <a:xfrm>
+            <a:off x="457200" y="1577340"/>
+            <a:ext cx="3977640" cy="387798"/>
+          </a:xfrm>
+          <a:prstGeom prst="rect">
+            <a:avLst/>
+          </a:prstGeom>
+        </p:spPr>
+        <p:txBody>
+          <a:bodyPr wrap="square" lIns="0" tIns="0" rIns="0" bIns="0">
+            <a:spAutoFit/>
+          </a:bodyPr>
+          <a:lstStyle>
+            <a:lvl1pPr>
+              <a:defRPr/>
+            </a:lvl1pPr>
+          </a:lstStyle>
+          <a:p>
+            <a:endParaRPr/>
+          </a:p>
+        </p:txBody>
+      </p:sp>
+      <p:sp>
+        <p:nvSpPr>
+          <p:cNvPr id="4" name="Holder 4"/>
+          <p:cNvSpPr>
+            <a:spLocks noGrp="1"/>
+          </p:cNvSpPr>
+          <p:nvPr>
+            <p:ph sz="half" idx="3"/>
+          </p:nvPr>
+        </p:nvSpPr>
+        <p:spPr>
+          <a:xfrm>
+            <a:off x="4709160" y="1577340"/>
+            <a:ext cx="3977640" cy="387798"/>
+          </a:xfrm>
+          <a:prstGeom prst="rect">
+            <a:avLst/>
+          </a:prstGeom>
+        </p:spPr>
+        <p:txBody>
+          <a:bodyPr wrap="square" lIns="0" tIns="0" rIns="0" bIns="0">
+            <a:spAutoFit/>
+          </a:bodyPr>
+          <a:lstStyle>
+            <a:lvl1pPr>
+              <a:defRPr/>
+            </a:lvl1pPr>
+          </a:lstStyle>
+          <a:p>
+            <a:endParaRPr/>
+          </a:p>
+        </p:txBody>
+      </p:sp>
+      <p:sp>
+        <p:nvSpPr>
+          <p:cNvPr id="5" name="Holder 5"/>
+          <p:cNvSpPr>
+            <a:spLocks noGrp="1"/>
+          </p:cNvSpPr>
+          <p:nvPr>
+            <p:ph type="ftr" sz="quarter" idx="5"/>
+          </p:nvPr>
+        </p:nvSpPr>
+        <p:spPr/>
+        <p:txBody>
+          <a:bodyPr lIns="0" tIns="0" rIns="0" bIns="0"/>
+          <a:lstStyle>
+            <a:lvl1pPr algn="ctr">
+              <a:defRPr>
+                <a:solidFill>
+                  <a:schemeClr val="tx1">
+                    <a:tint val="75000"/>
+                  </a:schemeClr>
+                </a:solidFill>
+              </a:defRPr>
+            </a:lvl1pPr>
+          </a:lstStyle>
+          <a:p>
+            <a:endParaRPr/>
+          </a:p>
+        </p:txBody>
+      </p:sp>
+      <p:sp>
+        <p:nvSpPr>
+          <p:cNvPr id="6" name="Holder 6"/>
+          <p:cNvSpPr>
+            <a:spLocks noGrp="1"/>
+          </p:cNvSpPr>
+          <p:nvPr>
+            <p:ph type="dt" sz="half" idx="6"/>
+          </p:nvPr>
+        </p:nvSpPr>
+        <p:spPr/>
+        <p:txBody>
+          <a:bodyPr lIns="0" tIns="0" rIns="0" bIns="0"/>
+          <a:lstStyle>
+            <a:lvl1pPr algn="l">
+              <a:defRPr>
+                <a:solidFill>
+                  <a:schemeClr val="tx1">
+                    <a:tint val="75000"/>
+                  </a:schemeClr>
+                </a:solidFill>
+              </a:defRPr>
+            </a:lvl1pPr>
+          </a:lstStyle>
+          <a:p>
+            <a:fld id="{1D8BD707-D9CF-40AE-B4C6-C98DA3205C09}" type="datetimeFigureOut">
+              <a:rPr lang="en-US"/>
+              <a:t>3/2/23</a:t>
+            </a:fld>
+            <a:endParaRPr lang="en-US"/>
+          </a:p>
+        </p:txBody>
+      </p:sp>
+      <p:sp>
+        <p:nvSpPr>
+          <p:cNvPr id="7" name="Holder 7"/>
+          <p:cNvSpPr>
+            <a:spLocks noGrp="1"/>
+          </p:cNvSpPr>
+          <p:nvPr>
+            <p:ph type="sldNum" sz="quarter" idx="7"/>
+          </p:nvPr>
+        </p:nvSpPr>
+        <p:spPr/>
+        <p:txBody>
+          <a:bodyPr lIns="0" tIns="0" rIns="0" bIns="0"/>
+          <a:lstStyle>
+            <a:lvl1pPr algn="r">
+              <a:defRPr>
+                <a:solidFill>
+                  <a:schemeClr val="tx1">
+                    <a:tint val="75000"/>
+                  </a:schemeClr>
+                </a:solidFill>
+              </a:defRPr>
+            </a:lvl1pPr>
+          </a:lstStyle>
+          <a:p>
+            <a:fld id="{B6F15528-21DE-4FAA-801E-634DDDAF4B2B}" type="slidenum">
+              <a:t>‹#›</a:t>
+            </a:fld>
+            <a:endParaRPr/>
+          </a:p>
+        </p:txBody>
+      </p:sp>
+    </p:spTree>
+    <p:extLst>
+      <p:ext uri="{BB962C8B-B14F-4D97-AF65-F5344CB8AC3E}">
+        <p14:creationId xmlns:p14="http://schemas.microsoft.com/office/powerpoint/2010/main" val="2488813998"/>
       </p:ext>
     </p:extLst>
   </p:cSld>
@@ -795,7 +1016,7 @@
           <a:p>
             <a:fld id="{B310209D-86A0-C041-8ED8-75882419F2CF}" type="datetimeFigureOut">
               <a:rPr lang="en-CH" smtClean="0"/>
-              <a:t>01.03.23</a:t>
+              <a:t>02.03.23</a:t>
             </a:fld>
             <a:endParaRPr lang="en-CH"/>
           </a:p>
@@ -1039,7 +1260,7 @@
           <a:p>
             <a:fld id="{B310209D-86A0-C041-8ED8-75882419F2CF}" type="datetimeFigureOut">
               <a:rPr lang="en-CH" smtClean="0"/>
-              <a:t>01.03.23</a:t>
+              <a:t>02.03.23</a:t>
             </a:fld>
             <a:endParaRPr lang="en-CH"/>
           </a:p>
@@ -1271,7 +1492,7 @@
           <a:p>
             <a:fld id="{B310209D-86A0-C041-8ED8-75882419F2CF}" type="datetimeFigureOut">
               <a:rPr lang="en-CH" smtClean="0"/>
-              <a:t>01.03.23</a:t>
+              <a:t>02.03.23</a:t>
             </a:fld>
             <a:endParaRPr lang="en-CH"/>
           </a:p>
@@ -1638,7 +1859,7 @@
           <a:p>
             <a:fld id="{B310209D-86A0-C041-8ED8-75882419F2CF}" type="datetimeFigureOut">
               <a:rPr lang="en-CH" smtClean="0"/>
-              <a:t>01.03.23</a:t>
+              <a:t>02.03.23</a:t>
             </a:fld>
             <a:endParaRPr lang="en-CH"/>
           </a:p>
@@ -1756,7 +1977,7 @@
           <a:p>
             <a:fld id="{B310209D-86A0-C041-8ED8-75882419F2CF}" type="datetimeFigureOut">
               <a:rPr lang="en-CH" smtClean="0"/>
-              <a:t>01.03.23</a:t>
+              <a:t>02.03.23</a:t>
             </a:fld>
             <a:endParaRPr lang="en-CH"/>
           </a:p>
@@ -1851,7 +2072,7 @@
           <a:p>
             <a:fld id="{B310209D-86A0-C041-8ED8-75882419F2CF}" type="datetimeFigureOut">
               <a:rPr lang="en-CH" smtClean="0"/>
-              <a:t>01.03.23</a:t>
+              <a:t>02.03.23</a:t>
             </a:fld>
             <a:endParaRPr lang="en-CH"/>
           </a:p>
@@ -2128,7 +2349,7 @@
           <a:p>
             <a:fld id="{B310209D-86A0-C041-8ED8-75882419F2CF}" type="datetimeFigureOut">
               <a:rPr lang="en-CH" smtClean="0"/>
-              <a:t>01.03.23</a:t>
+              <a:t>02.03.23</a:t>
             </a:fld>
             <a:endParaRPr lang="en-CH"/>
           </a:p>
@@ -2385,7 +2606,7 @@
           <a:p>
             <a:fld id="{B310209D-86A0-C041-8ED8-75882419F2CF}" type="datetimeFigureOut">
               <a:rPr lang="en-CH" smtClean="0"/>
-              <a:t>01.03.23</a:t>
+              <a:t>02.03.23</a:t>
             </a:fld>
             <a:endParaRPr lang="en-CH"/>
           </a:p>
@@ -2598,7 +2819,7 @@
           <a:p>
             <a:fld id="{B310209D-86A0-C041-8ED8-75882419F2CF}" type="datetimeFigureOut">
               <a:rPr lang="en-CH" smtClean="0"/>
-              <a:t>01.03.23</a:t>
+              <a:t>02.03.23</a:t>
             </a:fld>
             <a:endParaRPr lang="en-CH"/>
           </a:p>
@@ -2695,7 +2916,7 @@
           <p:nvPr userDrawn="1"/>
         </p:nvPicPr>
         <p:blipFill>
-          <a:blip r:embed="rId13" cstate="print"/>
+          <a:blip r:embed="rId14" cstate="print"/>
           <a:stretch>
             <a:fillRect/>
           </a:stretch>
@@ -2730,6 +2951,7 @@
     <p:sldLayoutId id="2147483669" r:id="rId9"/>
     <p:sldLayoutId id="2147483670" r:id="rId10"/>
     <p:sldLayoutId id="2147483671" r:id="rId11"/>
+    <p:sldLayoutId id="2147483672" r:id="rId12"/>
   </p:sldLayoutIdLst>
   <p:txStyles>
     <p:titleStyle>
@@ -3243,6 +3465,869 @@
       </p:grpSpPr>
       <p:sp>
         <p:nvSpPr>
+          <p:cNvPr id="3" name="Text Placeholder 2">
+            <a:extLst>
+              <a:ext uri="{FF2B5EF4-FFF2-40B4-BE49-F238E27FC236}">
+                <a16:creationId xmlns:a16="http://schemas.microsoft.com/office/drawing/2014/main" id="{4AB24D7D-0BF0-B644-A2D9-F8EFF71DEE6D}"/>
+              </a:ext>
+            </a:extLst>
+          </p:cNvPr>
+          <p:cNvSpPr>
+            <a:spLocks noGrp="1"/>
+          </p:cNvSpPr>
+          <p:nvPr>
+            <p:ph sz="half" idx="2"/>
+          </p:nvPr>
+        </p:nvSpPr>
+        <p:spPr>
+          <a:xfrm>
+            <a:off x="457200" y="1577340"/>
+            <a:ext cx="3977640" cy="7746736"/>
+          </a:xfrm>
+        </p:spPr>
+        <p:txBody>
+          <a:bodyPr/>
+          <a:lstStyle/>
+          <a:p>
+            <a:pPr marL="321457" indent="-321457"/>
+            <a:r>
+              <a:rPr lang="en-GB" dirty="0">
+                <a:hlinkClick r:id="rId2"/>
+              </a:rPr>
+              <a:t>Earth Microbiome Project</a:t>
+            </a:r>
+            <a:r>
+              <a:rPr lang="en-GB" dirty="0"/>
+              <a:t> </a:t>
+            </a:r>
+          </a:p>
+          <a:p>
+            <a:pPr marL="321457" indent="-321457"/>
+            <a:endParaRPr lang="en-GB" dirty="0"/>
+          </a:p>
+          <a:p>
+            <a:pPr marL="321457" indent="-321457"/>
+            <a:r>
+              <a:rPr lang="en-GB" dirty="0"/>
+              <a:t>sequenced hypervariable region 4 </a:t>
+            </a:r>
+            <a:r>
+              <a:rPr lang="en-GB" b="1" dirty="0"/>
+              <a:t>(V4) 16S rRNA </a:t>
+            </a:r>
+          </a:p>
+          <a:p>
+            <a:pPr marL="321457" indent="-321457"/>
+            <a:endParaRPr lang="en-GB" dirty="0"/>
+          </a:p>
+          <a:p>
+            <a:pPr marL="321457" indent="-321457"/>
+            <a:r>
+              <a:rPr lang="en-GB" dirty="0"/>
+              <a:t>analysis of human microbiome samples</a:t>
+            </a:r>
+          </a:p>
+          <a:p>
+            <a:pPr marL="321457" indent="-321457"/>
+            <a:endParaRPr lang="en-GB" dirty="0"/>
+          </a:p>
+          <a:p>
+            <a:pPr marL="321457" indent="-321457"/>
+            <a:r>
+              <a:rPr lang="en-GB" dirty="0"/>
+              <a:t>Original study is from </a:t>
+            </a:r>
+            <a:r>
+              <a:rPr lang="en-GB" dirty="0" err="1"/>
+              <a:t>Copraso</a:t>
+            </a:r>
+            <a:r>
+              <a:rPr lang="en-GB" dirty="0"/>
+              <a:t> et al. 2011</a:t>
+            </a:r>
+          </a:p>
+          <a:p>
+            <a:pPr marL="321457" indent="-321457"/>
+            <a:endParaRPr lang="en-GB" dirty="0"/>
+          </a:p>
+          <a:p>
+            <a:pPr marL="321457" indent="-321457"/>
+            <a:r>
+              <a:rPr lang="en-GB" dirty="0"/>
+              <a:t>Analysed with Quantitative Insights Into Microbial Ecology (QIIME2)</a:t>
+            </a:r>
+          </a:p>
+          <a:p>
+            <a:pPr marL="321457" indent="-321457"/>
+            <a:endParaRPr lang="en-GB" dirty="0"/>
+          </a:p>
+        </p:txBody>
+      </p:sp>
+      <p:sp>
+        <p:nvSpPr>
+          <p:cNvPr id="5" name="Content Placeholder 4">
+            <a:extLst>
+              <a:ext uri="{FF2B5EF4-FFF2-40B4-BE49-F238E27FC236}">
+                <a16:creationId xmlns:a16="http://schemas.microsoft.com/office/drawing/2014/main" id="{70E3B94F-0621-5A44-9DBD-9E4A128F7856}"/>
+              </a:ext>
+            </a:extLst>
+          </p:cNvPr>
+          <p:cNvSpPr>
+            <a:spLocks noGrp="1"/>
+          </p:cNvSpPr>
+          <p:nvPr>
+            <p:ph sz="half" idx="3"/>
+          </p:nvPr>
+        </p:nvSpPr>
+        <p:spPr/>
+        <p:txBody>
+          <a:bodyPr/>
+          <a:lstStyle/>
+          <a:p>
+            <a:endParaRPr lang="en-CH"/>
+          </a:p>
+        </p:txBody>
+      </p:sp>
+      <p:sp>
+        <p:nvSpPr>
+          <p:cNvPr id="4" name="bg object 16">
+            <a:extLst>
+              <a:ext uri="{FF2B5EF4-FFF2-40B4-BE49-F238E27FC236}">
+                <a16:creationId xmlns:a16="http://schemas.microsoft.com/office/drawing/2014/main" id="{53B14BB0-55FB-0A40-A7E7-55DE5AE8F4F8}"/>
+              </a:ext>
+            </a:extLst>
+          </p:cNvPr>
+          <p:cNvSpPr/>
+          <p:nvPr/>
+        </p:nvSpPr>
+        <p:spPr>
+          <a:xfrm>
+            <a:off x="1920" y="-1"/>
+            <a:ext cx="9140160" cy="825121"/>
+          </a:xfrm>
+          <a:prstGeom prst="rect">
+            <a:avLst/>
+          </a:prstGeom>
+          <a:blipFill>
+            <a:blip r:embed="rId3" cstate="print"/>
+            <a:stretch>
+              <a:fillRect/>
+            </a:stretch>
+          </a:blipFill>
+        </p:spPr>
+        <p:txBody>
+          <a:bodyPr wrap="square" lIns="0" tIns="0" rIns="0" bIns="0" rtlCol="0"/>
+          <a:lstStyle/>
+          <a:p>
+            <a:endParaRPr sz="1266"/>
+          </a:p>
+        </p:txBody>
+      </p:sp>
+      <p:pic>
+        <p:nvPicPr>
+          <p:cNvPr id="1026" name="Picture 2" descr="Human body icon outline Royalty Free Vector Image">
+            <a:extLst>
+              <a:ext uri="{FF2B5EF4-FFF2-40B4-BE49-F238E27FC236}">
+                <a16:creationId xmlns:a16="http://schemas.microsoft.com/office/drawing/2014/main" id="{1DBB749A-8747-4146-B793-051EE8DBDB5C}"/>
+              </a:ext>
+            </a:extLst>
+          </p:cNvPr>
+          <p:cNvPicPr>
+            <a:picLocks noChangeAspect="1" noChangeArrowheads="1"/>
+          </p:cNvPicPr>
+          <p:nvPr/>
+        </p:nvPicPr>
+        <p:blipFill rotWithShape="1">
+          <a:blip r:embed="rId4">
+            <a:extLst>
+              <a:ext uri="{28A0092B-C50C-407E-A947-70E740481C1C}">
+                <a14:useLocalDpi xmlns:a14="http://schemas.microsoft.com/office/drawing/2010/main" val="0"/>
+              </a:ext>
+            </a:extLst>
+          </a:blip>
+          <a:srcRect b="8390"/>
+          <a:stretch/>
+        </p:blipFill>
+        <p:spPr bwMode="auto">
+          <a:xfrm>
+            <a:off x="4628525" y="1577340"/>
+            <a:ext cx="4138910" cy="4094889"/>
+          </a:xfrm>
+          <a:prstGeom prst="rect">
+            <a:avLst/>
+          </a:prstGeom>
+          <a:noFill/>
+          <a:extLst>
+            <a:ext uri="{909E8E84-426E-40DD-AFC4-6F175D3DCCD1}">
+              <a14:hiddenFill xmlns:a14="http://schemas.microsoft.com/office/drawing/2010/main">
+                <a:solidFill>
+                  <a:srgbClr val="FFFFFF"/>
+                </a:solidFill>
+              </a14:hiddenFill>
+            </a:ext>
+          </a:extLst>
+        </p:spPr>
+      </p:pic>
+      <p:sp>
+        <p:nvSpPr>
+          <p:cNvPr id="8" name="TextBox 7">
+            <a:extLst>
+              <a:ext uri="{FF2B5EF4-FFF2-40B4-BE49-F238E27FC236}">
+                <a16:creationId xmlns:a16="http://schemas.microsoft.com/office/drawing/2014/main" id="{BAC1CC4D-807D-B047-A2B7-C5D4AF597275}"/>
+              </a:ext>
+            </a:extLst>
+          </p:cNvPr>
+          <p:cNvSpPr txBox="1"/>
+          <p:nvPr/>
+        </p:nvSpPr>
+        <p:spPr>
+          <a:xfrm>
+            <a:off x="5107781" y="6473649"/>
+            <a:ext cx="4574746" cy="287130"/>
+          </a:xfrm>
+          <a:prstGeom prst="rect">
+            <a:avLst/>
+          </a:prstGeom>
+          <a:noFill/>
+        </p:spPr>
+        <p:txBody>
+          <a:bodyPr wrap="square">
+            <a:spAutoFit/>
+          </a:bodyPr>
+          <a:lstStyle/>
+          <a:p>
+            <a:pPr marL="321457" indent="-321457">
+              <a:buFont typeface="Arial" panose="020B0604020202020204" pitchFamily="34" charset="0"/>
+              <a:buChar char="•"/>
+            </a:pPr>
+            <a:r>
+              <a:rPr lang="en-GB" sz="1266" dirty="0">
+                <a:hlinkClick r:id="rId5"/>
+              </a:rPr>
+              <a:t>https://pubmed.ncbi.nlm.nih.gov/21624126/</a:t>
+            </a:r>
+            <a:endParaRPr lang="en-GB" sz="1266" dirty="0"/>
+          </a:p>
+        </p:txBody>
+      </p:sp>
+      <p:sp>
+        <p:nvSpPr>
+          <p:cNvPr id="10" name="TextBox 9">
+            <a:extLst>
+              <a:ext uri="{FF2B5EF4-FFF2-40B4-BE49-F238E27FC236}">
+                <a16:creationId xmlns:a16="http://schemas.microsoft.com/office/drawing/2014/main" id="{58EAB3E5-E502-7E40-ABE6-16A2E72B1DE7}"/>
+              </a:ext>
+            </a:extLst>
+          </p:cNvPr>
+          <p:cNvSpPr txBox="1"/>
+          <p:nvPr/>
+        </p:nvSpPr>
+        <p:spPr>
+          <a:xfrm>
+            <a:off x="4709160" y="1088288"/>
+            <a:ext cx="4840577" cy="525016"/>
+          </a:xfrm>
+          <a:prstGeom prst="rect">
+            <a:avLst/>
+          </a:prstGeom>
+          <a:noFill/>
+        </p:spPr>
+        <p:txBody>
+          <a:bodyPr wrap="square">
+            <a:spAutoFit/>
+          </a:bodyPr>
+          <a:lstStyle/>
+          <a:p>
+            <a:r>
+              <a:rPr lang="en-GB" sz="1406" dirty="0"/>
+              <a:t>2 individuals: with/without antibiotics</a:t>
+            </a:r>
+          </a:p>
+          <a:p>
+            <a:r>
+              <a:rPr lang="en-GB" sz="1406" dirty="0"/>
+              <a:t>396 time points (here 5 times points)</a:t>
+            </a:r>
+            <a:endParaRPr lang="en-CH" sz="1406" dirty="0"/>
+          </a:p>
+        </p:txBody>
+      </p:sp>
+      <p:sp>
+        <p:nvSpPr>
+          <p:cNvPr id="9" name="Oval 8">
+            <a:extLst>
+              <a:ext uri="{FF2B5EF4-FFF2-40B4-BE49-F238E27FC236}">
+                <a16:creationId xmlns:a16="http://schemas.microsoft.com/office/drawing/2014/main" id="{648A0812-F109-424D-B1DC-EA6BA14850B8}"/>
+              </a:ext>
+            </a:extLst>
+          </p:cNvPr>
+          <p:cNvSpPr/>
+          <p:nvPr/>
+        </p:nvSpPr>
+        <p:spPr>
+          <a:xfrm>
+            <a:off x="6554391" y="3276469"/>
+            <a:ext cx="321469" cy="259687"/>
+          </a:xfrm>
+          <a:prstGeom prst="ellipse">
+            <a:avLst/>
+          </a:prstGeom>
+          <a:solidFill>
+            <a:schemeClr val="accent2">
+              <a:lumMod val="60000"/>
+              <a:lumOff val="40000"/>
+            </a:schemeClr>
+          </a:solidFill>
+          <a:ln>
+            <a:solidFill>
+              <a:srgbClr val="FF0000"/>
+            </a:solidFill>
+          </a:ln>
+        </p:spPr>
+        <p:style>
+          <a:lnRef idx="2">
+            <a:schemeClr val="accent1">
+              <a:shade val="50000"/>
+            </a:schemeClr>
+          </a:lnRef>
+          <a:fillRef idx="1">
+            <a:schemeClr val="accent1"/>
+          </a:fillRef>
+          <a:effectRef idx="0">
+            <a:schemeClr val="accent1"/>
+          </a:effectRef>
+          <a:fontRef idx="minor">
+            <a:schemeClr val="lt1"/>
+          </a:fontRef>
+        </p:style>
+        <p:txBody>
+          <a:bodyPr rtlCol="0" anchor="ctr"/>
+          <a:lstStyle/>
+          <a:p>
+            <a:pPr algn="ctr"/>
+            <a:endParaRPr lang="en-CH" sz="1266"/>
+          </a:p>
+        </p:txBody>
+      </p:sp>
+      <p:sp>
+        <p:nvSpPr>
+          <p:cNvPr id="12" name="Oval 11">
+            <a:extLst>
+              <a:ext uri="{FF2B5EF4-FFF2-40B4-BE49-F238E27FC236}">
+                <a16:creationId xmlns:a16="http://schemas.microsoft.com/office/drawing/2014/main" id="{A0A22E40-4B08-F845-BDC1-7F11226B1813}"/>
+              </a:ext>
+            </a:extLst>
+          </p:cNvPr>
+          <p:cNvSpPr/>
+          <p:nvPr/>
+        </p:nvSpPr>
+        <p:spPr>
+          <a:xfrm>
+            <a:off x="6537246" y="1929807"/>
+            <a:ext cx="321469" cy="259687"/>
+          </a:xfrm>
+          <a:prstGeom prst="ellipse">
+            <a:avLst/>
+          </a:prstGeom>
+          <a:solidFill>
+            <a:schemeClr val="accent2">
+              <a:lumMod val="60000"/>
+              <a:lumOff val="40000"/>
+            </a:schemeClr>
+          </a:solidFill>
+          <a:ln>
+            <a:solidFill>
+              <a:srgbClr val="FF0000"/>
+            </a:solidFill>
+          </a:ln>
+        </p:spPr>
+        <p:style>
+          <a:lnRef idx="2">
+            <a:schemeClr val="accent1">
+              <a:shade val="50000"/>
+            </a:schemeClr>
+          </a:lnRef>
+          <a:fillRef idx="1">
+            <a:schemeClr val="accent1"/>
+          </a:fillRef>
+          <a:effectRef idx="0">
+            <a:schemeClr val="accent1"/>
+          </a:effectRef>
+          <a:fontRef idx="minor">
+            <a:schemeClr val="lt1"/>
+          </a:fontRef>
+        </p:style>
+        <p:txBody>
+          <a:bodyPr rtlCol="0" anchor="ctr"/>
+          <a:lstStyle/>
+          <a:p>
+            <a:pPr algn="ctr"/>
+            <a:endParaRPr lang="en-CH" sz="1266"/>
+          </a:p>
+        </p:txBody>
+      </p:sp>
+      <p:sp>
+        <p:nvSpPr>
+          <p:cNvPr id="13" name="Oval 12">
+            <a:extLst>
+              <a:ext uri="{FF2B5EF4-FFF2-40B4-BE49-F238E27FC236}">
+                <a16:creationId xmlns:a16="http://schemas.microsoft.com/office/drawing/2014/main" id="{409F4154-CF14-7344-9A22-21A3D06AC25F}"/>
+              </a:ext>
+            </a:extLst>
+          </p:cNvPr>
+          <p:cNvSpPr/>
+          <p:nvPr/>
+        </p:nvSpPr>
+        <p:spPr>
+          <a:xfrm>
+            <a:off x="5935027" y="3494941"/>
+            <a:ext cx="321469" cy="259687"/>
+          </a:xfrm>
+          <a:prstGeom prst="ellipse">
+            <a:avLst/>
+          </a:prstGeom>
+          <a:solidFill>
+            <a:schemeClr val="accent2">
+              <a:lumMod val="60000"/>
+              <a:lumOff val="40000"/>
+            </a:schemeClr>
+          </a:solidFill>
+          <a:ln>
+            <a:solidFill>
+              <a:srgbClr val="FF0000"/>
+            </a:solidFill>
+          </a:ln>
+        </p:spPr>
+        <p:style>
+          <a:lnRef idx="2">
+            <a:schemeClr val="accent1">
+              <a:shade val="50000"/>
+            </a:schemeClr>
+          </a:lnRef>
+          <a:fillRef idx="1">
+            <a:schemeClr val="accent1"/>
+          </a:fillRef>
+          <a:effectRef idx="0">
+            <a:schemeClr val="accent1"/>
+          </a:effectRef>
+          <a:fontRef idx="minor">
+            <a:schemeClr val="lt1"/>
+          </a:fontRef>
+        </p:style>
+        <p:txBody>
+          <a:bodyPr rtlCol="0" anchor="ctr"/>
+          <a:lstStyle/>
+          <a:p>
+            <a:pPr algn="ctr"/>
+            <a:endParaRPr lang="en-CH" sz="1266"/>
+          </a:p>
+        </p:txBody>
+      </p:sp>
+      <p:sp>
+        <p:nvSpPr>
+          <p:cNvPr id="14" name="Oval 13">
+            <a:extLst>
+              <a:ext uri="{FF2B5EF4-FFF2-40B4-BE49-F238E27FC236}">
+                <a16:creationId xmlns:a16="http://schemas.microsoft.com/office/drawing/2014/main" id="{1C2A6B40-830F-0F46-BF62-4D6A7F01EA85}"/>
+              </a:ext>
+            </a:extLst>
+          </p:cNvPr>
+          <p:cNvSpPr/>
+          <p:nvPr/>
+        </p:nvSpPr>
+        <p:spPr>
+          <a:xfrm>
+            <a:off x="7150179" y="3494941"/>
+            <a:ext cx="321469" cy="259687"/>
+          </a:xfrm>
+          <a:prstGeom prst="ellipse">
+            <a:avLst/>
+          </a:prstGeom>
+          <a:solidFill>
+            <a:schemeClr val="accent2">
+              <a:lumMod val="60000"/>
+              <a:lumOff val="40000"/>
+            </a:schemeClr>
+          </a:solidFill>
+          <a:ln>
+            <a:solidFill>
+              <a:srgbClr val="FF0000"/>
+            </a:solidFill>
+          </a:ln>
+        </p:spPr>
+        <p:style>
+          <a:lnRef idx="2">
+            <a:schemeClr val="accent1">
+              <a:shade val="50000"/>
+            </a:schemeClr>
+          </a:lnRef>
+          <a:fillRef idx="1">
+            <a:schemeClr val="accent1"/>
+          </a:fillRef>
+          <a:effectRef idx="0">
+            <a:schemeClr val="accent1"/>
+          </a:effectRef>
+          <a:fontRef idx="minor">
+            <a:schemeClr val="lt1"/>
+          </a:fontRef>
+        </p:style>
+        <p:txBody>
+          <a:bodyPr rtlCol="0" anchor="ctr"/>
+          <a:lstStyle/>
+          <a:p>
+            <a:pPr algn="ctr"/>
+            <a:endParaRPr lang="en-CH" sz="1266"/>
+          </a:p>
+        </p:txBody>
+      </p:sp>
+      <p:sp>
+        <p:nvSpPr>
+          <p:cNvPr id="11" name="TextBox 10">
+            <a:extLst>
+              <a:ext uri="{FF2B5EF4-FFF2-40B4-BE49-F238E27FC236}">
+                <a16:creationId xmlns:a16="http://schemas.microsoft.com/office/drawing/2014/main" id="{C4C74586-7DD2-154D-83D0-8ADD7AE6E41B}"/>
+              </a:ext>
+            </a:extLst>
+          </p:cNvPr>
+          <p:cNvSpPr txBox="1"/>
+          <p:nvPr/>
+        </p:nvSpPr>
+        <p:spPr>
+          <a:xfrm>
+            <a:off x="7084146" y="2059651"/>
+            <a:ext cx="649537" cy="287130"/>
+          </a:xfrm>
+          <a:prstGeom prst="rect">
+            <a:avLst/>
+          </a:prstGeom>
+          <a:noFill/>
+        </p:spPr>
+        <p:txBody>
+          <a:bodyPr wrap="none" rtlCol="0">
+            <a:spAutoFit/>
+          </a:bodyPr>
+          <a:lstStyle/>
+          <a:p>
+            <a:r>
+              <a:rPr lang="en-CH" sz="1266" dirty="0"/>
+              <a:t>tongue</a:t>
+            </a:r>
+          </a:p>
+        </p:txBody>
+      </p:sp>
+      <p:sp>
+        <p:nvSpPr>
+          <p:cNvPr id="16" name="TextBox 15">
+            <a:extLst>
+              <a:ext uri="{FF2B5EF4-FFF2-40B4-BE49-F238E27FC236}">
+                <a16:creationId xmlns:a16="http://schemas.microsoft.com/office/drawing/2014/main" id="{C6884BD1-45E1-4040-8FE4-F49280A47AEF}"/>
+              </a:ext>
+            </a:extLst>
+          </p:cNvPr>
+          <p:cNvSpPr txBox="1"/>
+          <p:nvPr/>
+        </p:nvSpPr>
+        <p:spPr>
+          <a:xfrm>
+            <a:off x="7471648" y="3124913"/>
+            <a:ext cx="401072" cy="287130"/>
+          </a:xfrm>
+          <a:prstGeom prst="rect">
+            <a:avLst/>
+          </a:prstGeom>
+          <a:noFill/>
+        </p:spPr>
+        <p:txBody>
+          <a:bodyPr wrap="none" rtlCol="0">
+            <a:spAutoFit/>
+          </a:bodyPr>
+          <a:lstStyle/>
+          <a:p>
+            <a:r>
+              <a:rPr lang="en-CH" sz="1266" dirty="0"/>
+              <a:t>gut</a:t>
+            </a:r>
+          </a:p>
+        </p:txBody>
+      </p:sp>
+      <p:sp>
+        <p:nvSpPr>
+          <p:cNvPr id="17" name="TextBox 16">
+            <a:extLst>
+              <a:ext uri="{FF2B5EF4-FFF2-40B4-BE49-F238E27FC236}">
+                <a16:creationId xmlns:a16="http://schemas.microsoft.com/office/drawing/2014/main" id="{865F9800-59A9-A849-BF13-C2538AF1CDF2}"/>
+              </a:ext>
+            </a:extLst>
+          </p:cNvPr>
+          <p:cNvSpPr txBox="1"/>
+          <p:nvPr/>
+        </p:nvSpPr>
+        <p:spPr>
+          <a:xfrm>
+            <a:off x="7769542" y="3478493"/>
+            <a:ext cx="771558" cy="287130"/>
+          </a:xfrm>
+          <a:prstGeom prst="rect">
+            <a:avLst/>
+          </a:prstGeom>
+          <a:noFill/>
+        </p:spPr>
+        <p:txBody>
+          <a:bodyPr wrap="none" rtlCol="0">
+            <a:spAutoFit/>
+          </a:bodyPr>
+          <a:lstStyle/>
+          <a:p>
+            <a:r>
+              <a:rPr lang="en-GB" sz="1266" dirty="0"/>
+              <a:t>l</a:t>
+            </a:r>
+            <a:r>
+              <a:rPr lang="en-CH" sz="1266" dirty="0"/>
+              <a:t>eft palm</a:t>
+            </a:r>
+          </a:p>
+        </p:txBody>
+      </p:sp>
+      <p:sp>
+        <p:nvSpPr>
+          <p:cNvPr id="18" name="TextBox 17">
+            <a:extLst>
+              <a:ext uri="{FF2B5EF4-FFF2-40B4-BE49-F238E27FC236}">
+                <a16:creationId xmlns:a16="http://schemas.microsoft.com/office/drawing/2014/main" id="{58119952-1DA4-8F4E-92F9-25BD077ABE01}"/>
+              </a:ext>
+            </a:extLst>
+          </p:cNvPr>
+          <p:cNvSpPr txBox="1"/>
+          <p:nvPr/>
+        </p:nvSpPr>
+        <p:spPr>
+          <a:xfrm>
+            <a:off x="4887020" y="3436583"/>
+            <a:ext cx="859659" cy="287130"/>
+          </a:xfrm>
+          <a:prstGeom prst="rect">
+            <a:avLst/>
+          </a:prstGeom>
+          <a:noFill/>
+        </p:spPr>
+        <p:txBody>
+          <a:bodyPr wrap="none" rtlCol="0">
+            <a:spAutoFit/>
+          </a:bodyPr>
+          <a:lstStyle/>
+          <a:p>
+            <a:r>
+              <a:rPr lang="en-GB" sz="1266" dirty="0"/>
+              <a:t>right</a:t>
+            </a:r>
+            <a:r>
+              <a:rPr lang="en-CH" sz="1266" dirty="0"/>
+              <a:t> palm</a:t>
+            </a:r>
+          </a:p>
+        </p:txBody>
+      </p:sp>
+      <p:cxnSp>
+        <p:nvCxnSpPr>
+          <p:cNvPr id="23" name="Straight Arrow Connector 22">
+            <a:extLst>
+              <a:ext uri="{FF2B5EF4-FFF2-40B4-BE49-F238E27FC236}">
+                <a16:creationId xmlns:a16="http://schemas.microsoft.com/office/drawing/2014/main" id="{7D56C3D7-FC8A-DD4B-9776-10A02A1A0F3F}"/>
+              </a:ext>
+            </a:extLst>
+          </p:cNvPr>
+          <p:cNvCxnSpPr>
+            <a:cxnSpLocks/>
+            <a:stCxn id="9" idx="6"/>
+            <a:endCxn id="16" idx="1"/>
+          </p:cNvCxnSpPr>
+          <p:nvPr/>
+        </p:nvCxnSpPr>
+        <p:spPr>
+          <a:xfrm flipV="1">
+            <a:off x="6875860" y="3268478"/>
+            <a:ext cx="595788" cy="137835"/>
+          </a:xfrm>
+          <a:prstGeom prst="straightConnector1">
+            <a:avLst/>
+          </a:prstGeom>
+          <a:ln>
+            <a:tailEnd type="triangle"/>
+          </a:ln>
+        </p:spPr>
+        <p:style>
+          <a:lnRef idx="1">
+            <a:schemeClr val="accent2"/>
+          </a:lnRef>
+          <a:fillRef idx="0">
+            <a:schemeClr val="accent2"/>
+          </a:fillRef>
+          <a:effectRef idx="0">
+            <a:schemeClr val="accent2"/>
+          </a:effectRef>
+          <a:fontRef idx="minor">
+            <a:schemeClr val="tx1"/>
+          </a:fontRef>
+        </p:style>
+      </p:cxnSp>
+      <p:cxnSp>
+        <p:nvCxnSpPr>
+          <p:cNvPr id="25" name="Straight Arrow Connector 24">
+            <a:extLst>
+              <a:ext uri="{FF2B5EF4-FFF2-40B4-BE49-F238E27FC236}">
+                <a16:creationId xmlns:a16="http://schemas.microsoft.com/office/drawing/2014/main" id="{E8561B51-735F-E343-BC9B-D6E8E3E5DED6}"/>
+              </a:ext>
+            </a:extLst>
+          </p:cNvPr>
+          <p:cNvCxnSpPr>
+            <a:cxnSpLocks/>
+          </p:cNvCxnSpPr>
+          <p:nvPr/>
+        </p:nvCxnSpPr>
+        <p:spPr>
+          <a:xfrm>
+            <a:off x="7501652" y="3600295"/>
+            <a:ext cx="267891" cy="0"/>
+          </a:xfrm>
+          <a:prstGeom prst="straightConnector1">
+            <a:avLst/>
+          </a:prstGeom>
+          <a:ln>
+            <a:tailEnd type="triangle"/>
+          </a:ln>
+        </p:spPr>
+        <p:style>
+          <a:lnRef idx="1">
+            <a:schemeClr val="accent2"/>
+          </a:lnRef>
+          <a:fillRef idx="0">
+            <a:schemeClr val="accent2"/>
+          </a:fillRef>
+          <a:effectRef idx="0">
+            <a:schemeClr val="accent2"/>
+          </a:effectRef>
+          <a:fontRef idx="minor">
+            <a:schemeClr val="tx1"/>
+          </a:fontRef>
+        </p:style>
+      </p:cxnSp>
+      <p:cxnSp>
+        <p:nvCxnSpPr>
+          <p:cNvPr id="27" name="Straight Arrow Connector 26">
+            <a:extLst>
+              <a:ext uri="{FF2B5EF4-FFF2-40B4-BE49-F238E27FC236}">
+                <a16:creationId xmlns:a16="http://schemas.microsoft.com/office/drawing/2014/main" id="{0A88CA98-230F-144F-B2CD-0031BC273F4F}"/>
+              </a:ext>
+            </a:extLst>
+          </p:cNvPr>
+          <p:cNvCxnSpPr>
+            <a:cxnSpLocks/>
+            <a:stCxn id="13" idx="2"/>
+          </p:cNvCxnSpPr>
+          <p:nvPr/>
+        </p:nvCxnSpPr>
+        <p:spPr>
+          <a:xfrm flipH="1" flipV="1">
+            <a:off x="5650580" y="3567807"/>
+            <a:ext cx="284448" cy="56978"/>
+          </a:xfrm>
+          <a:prstGeom prst="straightConnector1">
+            <a:avLst/>
+          </a:prstGeom>
+          <a:ln>
+            <a:tailEnd type="triangle"/>
+          </a:ln>
+        </p:spPr>
+        <p:style>
+          <a:lnRef idx="1">
+            <a:schemeClr val="accent2"/>
+          </a:lnRef>
+          <a:fillRef idx="0">
+            <a:schemeClr val="accent2"/>
+          </a:fillRef>
+          <a:effectRef idx="0">
+            <a:schemeClr val="accent2"/>
+          </a:effectRef>
+          <a:fontRef idx="minor">
+            <a:schemeClr val="tx1"/>
+          </a:fontRef>
+        </p:style>
+      </p:cxnSp>
+      <p:cxnSp>
+        <p:nvCxnSpPr>
+          <p:cNvPr id="31" name="Straight Arrow Connector 30">
+            <a:extLst>
+              <a:ext uri="{FF2B5EF4-FFF2-40B4-BE49-F238E27FC236}">
+                <a16:creationId xmlns:a16="http://schemas.microsoft.com/office/drawing/2014/main" id="{74127447-978C-2741-BA73-C92E4219A816}"/>
+              </a:ext>
+            </a:extLst>
+          </p:cNvPr>
+          <p:cNvCxnSpPr>
+            <a:cxnSpLocks/>
+            <a:endCxn id="11" idx="1"/>
+          </p:cNvCxnSpPr>
+          <p:nvPr/>
+        </p:nvCxnSpPr>
+        <p:spPr>
+          <a:xfrm>
+            <a:off x="6810509" y="2111061"/>
+            <a:ext cx="273637" cy="92155"/>
+          </a:xfrm>
+          <a:prstGeom prst="straightConnector1">
+            <a:avLst/>
+          </a:prstGeom>
+          <a:ln>
+            <a:tailEnd type="triangle"/>
+          </a:ln>
+        </p:spPr>
+        <p:style>
+          <a:lnRef idx="1">
+            <a:schemeClr val="accent2"/>
+          </a:lnRef>
+          <a:fillRef idx="0">
+            <a:schemeClr val="accent2"/>
+          </a:fillRef>
+          <a:effectRef idx="0">
+            <a:schemeClr val="accent2"/>
+          </a:effectRef>
+          <a:fontRef idx="minor">
+            <a:schemeClr val="tx1"/>
+          </a:fontRef>
+        </p:style>
+      </p:cxnSp>
+    </p:spTree>
+    <p:extLst>
+      <p:ext uri="{BB962C8B-B14F-4D97-AF65-F5344CB8AC3E}">
+        <p14:creationId xmlns:p14="http://schemas.microsoft.com/office/powerpoint/2010/main" val="1440423365"/>
+      </p:ext>
+    </p:extLst>
+  </p:cSld>
+  <p:clrMapOvr>
+    <a:masterClrMapping/>
+  </p:clrMapOvr>
+</p:sld>
+</file>
+
+<file path=ppt/slides/slide4.xml><?xml version="1.0" encoding="utf-8"?>
+<p:sld xmlns:a="http://schemas.openxmlformats.org/drawingml/2006/main" xmlns:r="http://schemas.openxmlformats.org/officeDocument/2006/relationships" xmlns:p="http://schemas.openxmlformats.org/presentationml/2006/main">
+  <p:cSld>
+    <p:spTree>
+      <p:nvGrpSpPr>
+        <p:cNvPr id="1" name=""/>
+        <p:cNvGrpSpPr/>
+        <p:nvPr/>
+      </p:nvGrpSpPr>
+      <p:grpSpPr>
+        <a:xfrm>
+          <a:off x="0" y="0"/>
+          <a:ext cx="0" cy="0"/>
+          <a:chOff x="0" y="0"/>
+          <a:chExt cx="0" cy="0"/>
+        </a:xfrm>
+      </p:grpSpPr>
+      <p:sp>
+        <p:nvSpPr>
           <p:cNvPr id="2" name="Title 1">
             <a:extLst>
               <a:ext uri="{FF2B5EF4-FFF2-40B4-BE49-F238E27FC236}">
@@ -3679,7 +4764,7 @@
 </p:sld>
 </file>
 
-<file path=ppt/slides/slide4.xml><?xml version="1.0" encoding="utf-8"?>
+<file path=ppt/slides/slide5.xml><?xml version="1.0" encoding="utf-8"?>
 <p:sld xmlns:a="http://schemas.openxmlformats.org/drawingml/2006/main" xmlns:r="http://schemas.openxmlformats.org/officeDocument/2006/relationships" xmlns:p="http://schemas.openxmlformats.org/presentationml/2006/main">
   <p:cSld>
     <p:spTree>
@@ -3803,7 +4888,7 @@
         <p:spPr>
           <a:xfrm>
             <a:off x="4676289" y="1371600"/>
-            <a:ext cx="4308685" cy="1477328"/>
+            <a:ext cx="4308685" cy="1754326"/>
           </a:xfrm>
           <a:prstGeom prst="rect">
             <a:avLst/>
@@ -3827,7 +4912,7 @@
           <a:p>
             <a:r>
               <a:rPr lang="en-CH" dirty="0"/>
-              <a:t>Have a detailed read-through the parameters and decide on them based on what we discussed before!</a:t>
+              <a:t>Have a detailed read-through the parameters and decide on them based on what we discussed before! For solutions on whats advised see next page.</a:t>
             </a:r>
           </a:p>
         </p:txBody>
@@ -3845,7 +4930,7 @@
 </p:sld>
 </file>
 
-<file path=ppt/slides/slide5.xml><?xml version="1.0" encoding="utf-8"?>
+<file path=ppt/slides/slide6.xml><?xml version="1.0" encoding="utf-8"?>
 <p:sld xmlns:a="http://schemas.openxmlformats.org/drawingml/2006/main" xmlns:r="http://schemas.openxmlformats.org/officeDocument/2006/relationships" xmlns:p="http://schemas.openxmlformats.org/presentationml/2006/main">
   <p:cSld>
     <p:spTree>
@@ -3867,6 +4952,236 @@
           <p:cNvPr id="2" name="Title 1">
             <a:extLst>
               <a:ext uri="{FF2B5EF4-FFF2-40B4-BE49-F238E27FC236}">
+                <a16:creationId xmlns:a16="http://schemas.microsoft.com/office/drawing/2014/main" id="{5AE2D64D-7C8D-97D9-EB06-D1D978F7E07B}"/>
+              </a:ext>
+            </a:extLst>
+          </p:cNvPr>
+          <p:cNvSpPr>
+            <a:spLocks noGrp="1"/>
+          </p:cNvSpPr>
+          <p:nvPr>
+            <p:ph type="title"/>
+          </p:nvPr>
+        </p:nvSpPr>
+        <p:spPr/>
+        <p:txBody>
+          <a:bodyPr/>
+          <a:lstStyle/>
+          <a:p>
+            <a:r>
+              <a:rPr lang="en-CH" dirty="0"/>
+              <a:t>Parameters you need to specify</a:t>
+            </a:r>
+          </a:p>
+        </p:txBody>
+      </p:sp>
+      <p:sp>
+        <p:nvSpPr>
+          <p:cNvPr id="3" name="Content Placeholder 2">
+            <a:extLst>
+              <a:ext uri="{FF2B5EF4-FFF2-40B4-BE49-F238E27FC236}">
+                <a16:creationId xmlns:a16="http://schemas.microsoft.com/office/drawing/2014/main" id="{49861975-21D6-FDE1-7EC9-5F7681FB5915}"/>
+              </a:ext>
+            </a:extLst>
+          </p:cNvPr>
+          <p:cNvSpPr>
+            <a:spLocks noGrp="1"/>
+          </p:cNvSpPr>
+          <p:nvPr>
+            <p:ph idx="1"/>
+          </p:nvPr>
+        </p:nvSpPr>
+        <p:spPr/>
+        <p:txBody>
+          <a:bodyPr>
+            <a:normAutofit fontScale="85000" lnSpcReduction="20000"/>
+          </a:bodyPr>
+          <a:lstStyle/>
+          <a:p>
+            <a:r>
+              <a:rPr lang="en-CH" dirty="0"/>
+              <a:t>Make sure the following parameters are set before submitting the job:</a:t>
+            </a:r>
+          </a:p>
+          <a:p>
+            <a:endParaRPr lang="en-CH" dirty="0"/>
+          </a:p>
+          <a:p>
+            <a:pPr lvl="1"/>
+            <a:r>
+              <a:rPr lang="en-GB" dirty="0"/>
+              <a:t>T</a:t>
+            </a:r>
+            <a:r>
+              <a:rPr lang="en-CH" dirty="0"/>
+              <a:t>rim_left: 0</a:t>
+            </a:r>
+          </a:p>
+          <a:p>
+            <a:pPr lvl="1"/>
+            <a:r>
+              <a:rPr lang="en-CH" dirty="0"/>
+              <a:t>Truncate_len: 120</a:t>
+            </a:r>
+          </a:p>
+          <a:p>
+            <a:pPr lvl="1"/>
+            <a:r>
+              <a:rPr lang="en-CH" dirty="0"/>
+              <a:t>Sampling_depth: 1100</a:t>
+            </a:r>
+          </a:p>
+          <a:p>
+            <a:pPr lvl="1"/>
+            <a:r>
+              <a:rPr lang="en-CH" dirty="0"/>
+              <a:t>M</a:t>
+            </a:r>
+            <a:r>
+              <a:rPr lang="en-GB" dirty="0"/>
+              <a:t>a</a:t>
+            </a:r>
+            <a:r>
+              <a:rPr lang="en-CH" dirty="0"/>
+              <a:t>x_rarefaction_depth: 4000</a:t>
+            </a:r>
+          </a:p>
+          <a:p>
+            <a:pPr lvl="1"/>
+            <a:r>
+              <a:rPr lang="en-CH" dirty="0"/>
+              <a:t>Min_freq: 1</a:t>
+            </a:r>
+          </a:p>
+          <a:p>
+            <a:pPr lvl="1"/>
+            <a:r>
+              <a:rPr lang="en-CH" dirty="0"/>
+              <a:t>Min_samples: 3</a:t>
+            </a:r>
+          </a:p>
+          <a:p>
+            <a:pPr lvl="1"/>
+            <a:r>
+              <a:rPr lang="en-CH" dirty="0"/>
+              <a:t>Group: True</a:t>
+            </a:r>
+          </a:p>
+          <a:p>
+            <a:pPr lvl="1"/>
+            <a:r>
+              <a:rPr lang="en-CH" dirty="0"/>
+              <a:t>Grouping: ReportedAntibioticUsage</a:t>
+            </a:r>
+          </a:p>
+          <a:p>
+            <a:pPr lvl="1"/>
+            <a:r>
+              <a:rPr lang="en-CH" dirty="0"/>
+              <a:t>Database:Greengenes</a:t>
+            </a:r>
+          </a:p>
+          <a:p>
+            <a:pPr lvl="1"/>
+            <a:r>
+              <a:rPr lang="en-CH" dirty="0"/>
+              <a:t>Primer: V4</a:t>
+            </a:r>
+          </a:p>
+          <a:p>
+            <a:pPr lvl="1"/>
+            <a:r>
+              <a:rPr lang="en-CH" dirty="0"/>
+              <a:t>Forward_primer: 4th from the top</a:t>
+            </a:r>
+          </a:p>
+          <a:p>
+            <a:pPr lvl="1"/>
+            <a:r>
+              <a:rPr lang="en-CH" dirty="0"/>
+              <a:t>Reverse_primer: 4th from the top</a:t>
+            </a:r>
+          </a:p>
+          <a:p>
+            <a:pPr lvl="1"/>
+            <a:endParaRPr lang="en-CH" dirty="0"/>
+          </a:p>
+        </p:txBody>
+      </p:sp>
+      <p:sp>
+        <p:nvSpPr>
+          <p:cNvPr id="4" name="TextBox 3">
+            <a:extLst>
+              <a:ext uri="{FF2B5EF4-FFF2-40B4-BE49-F238E27FC236}">
+                <a16:creationId xmlns:a16="http://schemas.microsoft.com/office/drawing/2014/main" id="{100B41BD-DADE-C635-8B27-4B180DBC98C8}"/>
+              </a:ext>
+            </a:extLst>
+          </p:cNvPr>
+          <p:cNvSpPr txBox="1"/>
+          <p:nvPr/>
+        </p:nvSpPr>
+        <p:spPr>
+          <a:xfrm>
+            <a:off x="6267236" y="5992297"/>
+            <a:ext cx="1549014" cy="369332"/>
+          </a:xfrm>
+          <a:prstGeom prst="rect">
+            <a:avLst/>
+          </a:prstGeom>
+          <a:noFill/>
+        </p:spPr>
+        <p:txBody>
+          <a:bodyPr wrap="none" rtlCol="0">
+            <a:spAutoFit/>
+          </a:bodyPr>
+          <a:lstStyle/>
+          <a:p>
+            <a:r>
+              <a:rPr lang="en-CH" dirty="0">
+                <a:solidFill>
+                  <a:srgbClr val="FF0000"/>
+                </a:solidFill>
+              </a:rPr>
+              <a:t>Press SUBMIT!</a:t>
+            </a:r>
+          </a:p>
+        </p:txBody>
+      </p:sp>
+    </p:spTree>
+    <p:extLst>
+      <p:ext uri="{BB962C8B-B14F-4D97-AF65-F5344CB8AC3E}">
+        <p14:creationId xmlns:p14="http://schemas.microsoft.com/office/powerpoint/2010/main" val="4028032145"/>
+      </p:ext>
+    </p:extLst>
+  </p:cSld>
+  <p:clrMapOvr>
+    <a:masterClrMapping/>
+  </p:clrMapOvr>
+</p:sld>
+</file>
+
+<file path=ppt/slides/slide7.xml><?xml version="1.0" encoding="utf-8"?>
+<p:sld xmlns:a="http://schemas.openxmlformats.org/drawingml/2006/main" xmlns:r="http://schemas.openxmlformats.org/officeDocument/2006/relationships" xmlns:p="http://schemas.openxmlformats.org/presentationml/2006/main">
+  <p:cSld>
+    <p:spTree>
+      <p:nvGrpSpPr>
+        <p:cNvPr id="1" name=""/>
+        <p:cNvGrpSpPr/>
+        <p:nvPr/>
+      </p:nvGrpSpPr>
+      <p:grpSpPr>
+        <a:xfrm>
+          <a:off x="0" y="0"/>
+          <a:ext cx="0" cy="0"/>
+          <a:chOff x="0" y="0"/>
+          <a:chExt cx="0" cy="0"/>
+        </a:xfrm>
+      </p:grpSpPr>
+      <p:sp>
+        <p:nvSpPr>
+          <p:cNvPr id="2" name="Title 1">
+            <a:extLst>
+              <a:ext uri="{FF2B5EF4-FFF2-40B4-BE49-F238E27FC236}">
                 <a16:creationId xmlns:a16="http://schemas.microsoft.com/office/drawing/2014/main" id="{84EC4924-E9C7-DF80-A6ED-B7CB4C5B6533}"/>
               </a:ext>
             </a:extLst>
@@ -3914,7 +5229,7 @@
         <p:spPr/>
         <p:txBody>
           <a:bodyPr>
-            <a:normAutofit fontScale="62500" lnSpcReduction="20000"/>
+            <a:normAutofit fontScale="55000" lnSpcReduction="20000"/>
           </a:bodyPr>
           <a:lstStyle/>
           <a:p>
@@ -3924,6 +5239,9 @@
             </a:r>
           </a:p>
           <a:p>
+            <a:endParaRPr lang="en-CH" dirty="0"/>
+          </a:p>
+          <a:p>
             <a:pPr lvl="1"/>
             <a:r>
               <a:rPr lang="en-CH" dirty="0"/>
@@ -4115,7 +5433,7 @@
             </a:pPr>
             <a:r>
               <a:rPr lang="en-CH" dirty="0"/>
-              <a:t>Have a look at all the reports. Inspect!</a:t>
+              <a:t>Have a look at all the reports. Inspect! Now go back to the github page and click on the link to the tutorial to answer a few questions.</a:t>
             </a:r>
           </a:p>
         </p:txBody>

</xml_diff>

<commit_message>
add another day2 tutorial
</commit_message>
<xml_diff>
--- a/QIIME2.pptx
+++ b/QIIME2.pptx
@@ -249,7 +249,7 @@
           <a:p>
             <a:fld id="{B310209D-86A0-C041-8ED8-75882419F2CF}" type="datetimeFigureOut">
               <a:rPr lang="en-CH" smtClean="0"/>
-              <a:t>02.03.23</a:t>
+              <a:t>23.03.23</a:t>
             </a:fld>
             <a:endParaRPr lang="en-CH"/>
           </a:p>
@@ -447,7 +447,7 @@
           <a:p>
             <a:fld id="{B310209D-86A0-C041-8ED8-75882419F2CF}" type="datetimeFigureOut">
               <a:rPr lang="en-CH" smtClean="0"/>
-              <a:t>02.03.23</a:t>
+              <a:t>23.03.23</a:t>
             </a:fld>
             <a:endParaRPr lang="en-CH"/>
           </a:p>
@@ -627,7 +627,7 @@
           <a:p>
             <a:fld id="{B310209D-86A0-C041-8ED8-75882419F2CF}" type="datetimeFigureOut">
               <a:rPr lang="en-CH" smtClean="0"/>
-              <a:t>02.03.23</a:t>
+              <a:t>23.03.23</a:t>
             </a:fld>
             <a:endParaRPr lang="en-CH"/>
           </a:p>
@@ -856,7 +856,7 @@
           <a:p>
             <a:fld id="{1D8BD707-D9CF-40AE-B4C6-C98DA3205C09}" type="datetimeFigureOut">
               <a:rPr lang="en-US"/>
-              <a:t>3/2/23</a:t>
+              <a:t>3/23/23</a:t>
             </a:fld>
             <a:endParaRPr lang="en-US"/>
           </a:p>
@@ -1016,7 +1016,7 @@
           <a:p>
             <a:fld id="{B310209D-86A0-C041-8ED8-75882419F2CF}" type="datetimeFigureOut">
               <a:rPr lang="en-CH" smtClean="0"/>
-              <a:t>02.03.23</a:t>
+              <a:t>23.03.23</a:t>
             </a:fld>
             <a:endParaRPr lang="en-CH"/>
           </a:p>
@@ -1260,7 +1260,7 @@
           <a:p>
             <a:fld id="{B310209D-86A0-C041-8ED8-75882419F2CF}" type="datetimeFigureOut">
               <a:rPr lang="en-CH" smtClean="0"/>
-              <a:t>02.03.23</a:t>
+              <a:t>23.03.23</a:t>
             </a:fld>
             <a:endParaRPr lang="en-CH"/>
           </a:p>
@@ -1492,7 +1492,7 @@
           <a:p>
             <a:fld id="{B310209D-86A0-C041-8ED8-75882419F2CF}" type="datetimeFigureOut">
               <a:rPr lang="en-CH" smtClean="0"/>
-              <a:t>02.03.23</a:t>
+              <a:t>23.03.23</a:t>
             </a:fld>
             <a:endParaRPr lang="en-CH"/>
           </a:p>
@@ -1859,7 +1859,7 @@
           <a:p>
             <a:fld id="{B310209D-86A0-C041-8ED8-75882419F2CF}" type="datetimeFigureOut">
               <a:rPr lang="en-CH" smtClean="0"/>
-              <a:t>02.03.23</a:t>
+              <a:t>23.03.23</a:t>
             </a:fld>
             <a:endParaRPr lang="en-CH"/>
           </a:p>
@@ -1977,7 +1977,7 @@
           <a:p>
             <a:fld id="{B310209D-86A0-C041-8ED8-75882419F2CF}" type="datetimeFigureOut">
               <a:rPr lang="en-CH" smtClean="0"/>
-              <a:t>02.03.23</a:t>
+              <a:t>23.03.23</a:t>
             </a:fld>
             <a:endParaRPr lang="en-CH"/>
           </a:p>
@@ -2072,7 +2072,7 @@
           <a:p>
             <a:fld id="{B310209D-86A0-C041-8ED8-75882419F2CF}" type="datetimeFigureOut">
               <a:rPr lang="en-CH" smtClean="0"/>
-              <a:t>02.03.23</a:t>
+              <a:t>23.03.23</a:t>
             </a:fld>
             <a:endParaRPr lang="en-CH"/>
           </a:p>
@@ -2349,7 +2349,7 @@
           <a:p>
             <a:fld id="{B310209D-86A0-C041-8ED8-75882419F2CF}" type="datetimeFigureOut">
               <a:rPr lang="en-CH" smtClean="0"/>
-              <a:t>02.03.23</a:t>
+              <a:t>23.03.23</a:t>
             </a:fld>
             <a:endParaRPr lang="en-CH"/>
           </a:p>
@@ -2606,7 +2606,7 @@
           <a:p>
             <a:fld id="{B310209D-86A0-C041-8ED8-75882419F2CF}" type="datetimeFigureOut">
               <a:rPr lang="en-CH" smtClean="0"/>
-              <a:t>02.03.23</a:t>
+              <a:t>23.03.23</a:t>
             </a:fld>
             <a:endParaRPr lang="en-CH"/>
           </a:p>
@@ -2819,7 +2819,7 @@
           <a:p>
             <a:fld id="{B310209D-86A0-C041-8ED8-75882419F2CF}" type="datetimeFigureOut">
               <a:rPr lang="en-CH" smtClean="0"/>
-              <a:t>02.03.23</a:t>
+              <a:t>23.03.23</a:t>
             </a:fld>
             <a:endParaRPr lang="en-CH"/>
           </a:p>
@@ -4751,6 +4751,41 @@
           </a:prstGeom>
         </p:spPr>
       </p:pic>
+      <p:sp>
+        <p:nvSpPr>
+          <p:cNvPr id="4" name="TextBox 3">
+            <a:extLst>
+              <a:ext uri="{FF2B5EF4-FFF2-40B4-BE49-F238E27FC236}">
+                <a16:creationId xmlns:a16="http://schemas.microsoft.com/office/drawing/2014/main" id="{62BCB3F7-3831-A69A-21BE-6A60B880FFA3}"/>
+              </a:ext>
+            </a:extLst>
+          </p:cNvPr>
+          <p:cNvSpPr txBox="1"/>
+          <p:nvPr/>
+        </p:nvSpPr>
+        <p:spPr>
+          <a:xfrm>
+            <a:off x="114685" y="5678753"/>
+            <a:ext cx="2873166" cy="646331"/>
+          </a:xfrm>
+          <a:prstGeom prst="rect">
+            <a:avLst/>
+          </a:prstGeom>
+          <a:noFill/>
+        </p:spPr>
+        <p:txBody>
+          <a:bodyPr wrap="square" rtlCol="0">
+            <a:spAutoFit/>
+          </a:bodyPr>
+          <a:lstStyle/>
+          <a:p>
+            <a:r>
+              <a:rPr lang="en-CH" dirty="0"/>
+              <a:t>Please see the next page for parameter specification</a:t>
+            </a:r>
+          </a:p>
+        </p:txBody>
+      </p:sp>
     </p:spTree>
     <p:extLst>
       <p:ext uri="{BB962C8B-B14F-4D97-AF65-F5344CB8AC3E}">
@@ -5147,6 +5182,97 @@
           </a:p>
         </p:txBody>
       </p:sp>
+      <p:cxnSp>
+        <p:nvCxnSpPr>
+          <p:cNvPr id="6" name="Straight Arrow Connector 5">
+            <a:extLst>
+              <a:ext uri="{FF2B5EF4-FFF2-40B4-BE49-F238E27FC236}">
+                <a16:creationId xmlns:a16="http://schemas.microsoft.com/office/drawing/2014/main" id="{BCC09B67-ACAF-D2E9-D519-070F2992AE4B}"/>
+              </a:ext>
+            </a:extLst>
+          </p:cNvPr>
+          <p:cNvCxnSpPr>
+            <a:cxnSpLocks/>
+          </p:cNvCxnSpPr>
+          <p:nvPr/>
+        </p:nvCxnSpPr>
+        <p:spPr>
+          <a:xfrm flipV="1">
+            <a:off x="5193792" y="4559808"/>
+            <a:ext cx="1073444" cy="280416"/>
+          </a:xfrm>
+          <a:prstGeom prst="straightConnector1">
+            <a:avLst/>
+          </a:prstGeom>
+          <a:ln w="57150">
+            <a:solidFill>
+              <a:srgbClr val="FF0000"/>
+            </a:solidFill>
+            <a:tailEnd type="triangle"/>
+          </a:ln>
+        </p:spPr>
+        <p:style>
+          <a:lnRef idx="1">
+            <a:schemeClr val="accent2"/>
+          </a:lnRef>
+          <a:fillRef idx="0">
+            <a:schemeClr val="accent2"/>
+          </a:fillRef>
+          <a:effectRef idx="0">
+            <a:schemeClr val="accent2"/>
+          </a:effectRef>
+          <a:fontRef idx="minor">
+            <a:schemeClr val="tx1"/>
+          </a:fontRef>
+        </p:style>
+      </p:cxnSp>
+      <p:sp>
+        <p:nvSpPr>
+          <p:cNvPr id="8" name="TextBox 7">
+            <a:extLst>
+              <a:ext uri="{FF2B5EF4-FFF2-40B4-BE49-F238E27FC236}">
+                <a16:creationId xmlns:a16="http://schemas.microsoft.com/office/drawing/2014/main" id="{06E77C6A-1C51-3BF5-0754-4B01CCCA4D08}"/>
+              </a:ext>
+            </a:extLst>
+          </p:cNvPr>
+          <p:cNvSpPr txBox="1"/>
+          <p:nvPr/>
+        </p:nvSpPr>
+        <p:spPr>
+          <a:xfrm>
+            <a:off x="6181344" y="3429000"/>
+            <a:ext cx="3096768" cy="1754326"/>
+          </a:xfrm>
+          <a:prstGeom prst="rect">
+            <a:avLst/>
+          </a:prstGeom>
+          <a:noFill/>
+        </p:spPr>
+        <p:txBody>
+          <a:bodyPr wrap="square" rtlCol="0">
+            <a:spAutoFit/>
+          </a:bodyPr>
+          <a:lstStyle/>
+          <a:p>
+            <a:r>
+              <a:rPr lang="en-CH" dirty="0"/>
+              <a:t>Here is where the two of you will differ. One of you needs to choose </a:t>
+            </a:r>
+            <a:r>
+              <a:rPr lang="en-CH" b="1" dirty="0"/>
+              <a:t>ReportedAntibioticResistance </a:t>
+            </a:r>
+            <a:r>
+              <a:rPr lang="en-CH" dirty="0"/>
+              <a:t>and the second one will choose </a:t>
+            </a:r>
+            <a:r>
+              <a:rPr lang="en-CH" b="1" dirty="0"/>
+              <a:t>BodySite!!!</a:t>
+            </a:r>
+          </a:p>
+        </p:txBody>
+      </p:sp>
     </p:spTree>
     <p:extLst>
       <p:ext uri="{BB962C8B-B14F-4D97-AF65-F5344CB8AC3E}">
@@ -5433,7 +5559,7 @@
             </a:pPr>
             <a:r>
               <a:rPr lang="en-CH" dirty="0"/>
-              <a:t>Have a look at all the reports. Inspect! Now go back to the github page and click on the link to the tutorial to answer a few questions.</a:t>
+              <a:t>Have a look at all the reports. Inspect! Now go back to the github page and click on the link to the tutorial to answer a few questions. You will need your partner’s information in order to answer all the questions.</a:t>
             </a:r>
           </a:p>
         </p:txBody>

</xml_diff>